<commit_message>
Add missing files for catch equation
</commit_message>
<xml_diff>
--- a/PathsForRoutineInR.pptx
+++ b/PathsForRoutineInR.pptx
@@ -288,7 +288,7 @@
           <a:p>
             <a:fld id="{0C314AFE-C1DB-47D8-A73C-CA91BDDCDD74}" type="datetimeFigureOut">
               <a:rPr lang="en-GB" smtClean="0"/>
-              <a:t>19/08/2016</a:t>
+              <a:t>23/08/2016</a:t>
             </a:fld>
             <a:endParaRPr lang="en-GB"/>
           </a:p>
@@ -458,7 +458,7 @@
           <a:p>
             <a:fld id="{0C314AFE-C1DB-47D8-A73C-CA91BDDCDD74}" type="datetimeFigureOut">
               <a:rPr lang="en-GB" smtClean="0"/>
-              <a:t>19/08/2016</a:t>
+              <a:t>23/08/2016</a:t>
             </a:fld>
             <a:endParaRPr lang="en-GB"/>
           </a:p>
@@ -638,7 +638,7 @@
           <a:p>
             <a:fld id="{0C314AFE-C1DB-47D8-A73C-CA91BDDCDD74}" type="datetimeFigureOut">
               <a:rPr lang="en-GB" smtClean="0"/>
-              <a:t>19/08/2016</a:t>
+              <a:t>23/08/2016</a:t>
             </a:fld>
             <a:endParaRPr lang="en-GB"/>
           </a:p>
@@ -808,7 +808,7 @@
           <a:p>
             <a:fld id="{0C314AFE-C1DB-47D8-A73C-CA91BDDCDD74}" type="datetimeFigureOut">
               <a:rPr lang="en-GB" smtClean="0"/>
-              <a:t>19/08/2016</a:t>
+              <a:t>23/08/2016</a:t>
             </a:fld>
             <a:endParaRPr lang="en-GB"/>
           </a:p>
@@ -1054,7 +1054,7 @@
           <a:p>
             <a:fld id="{0C314AFE-C1DB-47D8-A73C-CA91BDDCDD74}" type="datetimeFigureOut">
               <a:rPr lang="en-GB" smtClean="0"/>
-              <a:t>19/08/2016</a:t>
+              <a:t>23/08/2016</a:t>
             </a:fld>
             <a:endParaRPr lang="en-GB"/>
           </a:p>
@@ -1342,7 +1342,7 @@
           <a:p>
             <a:fld id="{0C314AFE-C1DB-47D8-A73C-CA91BDDCDD74}" type="datetimeFigureOut">
               <a:rPr lang="en-GB" smtClean="0"/>
-              <a:t>19/08/2016</a:t>
+              <a:t>23/08/2016</a:t>
             </a:fld>
             <a:endParaRPr lang="en-GB"/>
           </a:p>
@@ -1764,7 +1764,7 @@
           <a:p>
             <a:fld id="{0C314AFE-C1DB-47D8-A73C-CA91BDDCDD74}" type="datetimeFigureOut">
               <a:rPr lang="en-GB" smtClean="0"/>
-              <a:t>19/08/2016</a:t>
+              <a:t>23/08/2016</a:t>
             </a:fld>
             <a:endParaRPr lang="en-GB"/>
           </a:p>
@@ -1882,7 +1882,7 @@
           <a:p>
             <a:fld id="{0C314AFE-C1DB-47D8-A73C-CA91BDDCDD74}" type="datetimeFigureOut">
               <a:rPr lang="en-GB" smtClean="0"/>
-              <a:t>19/08/2016</a:t>
+              <a:t>23/08/2016</a:t>
             </a:fld>
             <a:endParaRPr lang="en-GB"/>
           </a:p>
@@ -1977,7 +1977,7 @@
           <a:p>
             <a:fld id="{0C314AFE-C1DB-47D8-A73C-CA91BDDCDD74}" type="datetimeFigureOut">
               <a:rPr lang="en-GB" smtClean="0"/>
-              <a:t>19/08/2016</a:t>
+              <a:t>23/08/2016</a:t>
             </a:fld>
             <a:endParaRPr lang="en-GB"/>
           </a:p>
@@ -2254,7 +2254,7 @@
           <a:p>
             <a:fld id="{0C314AFE-C1DB-47D8-A73C-CA91BDDCDD74}" type="datetimeFigureOut">
               <a:rPr lang="en-GB" smtClean="0"/>
-              <a:t>19/08/2016</a:t>
+              <a:t>23/08/2016</a:t>
             </a:fld>
             <a:endParaRPr lang="en-GB"/>
           </a:p>
@@ -2507,7 +2507,7 @@
           <a:p>
             <a:fld id="{0C314AFE-C1DB-47D8-A73C-CA91BDDCDD74}" type="datetimeFigureOut">
               <a:rPr lang="en-GB" smtClean="0"/>
-              <a:t>19/08/2016</a:t>
+              <a:t>23/08/2016</a:t>
             </a:fld>
             <a:endParaRPr lang="en-GB"/>
           </a:p>
@@ -2720,7 +2720,7 @@
           <a:p>
             <a:fld id="{0C314AFE-C1DB-47D8-A73C-CA91BDDCDD74}" type="datetimeFigureOut">
               <a:rPr lang="en-GB" smtClean="0"/>
-              <a:t>19/08/2016</a:t>
+              <a:t>23/08/2016</a:t>
             </a:fld>
             <a:endParaRPr lang="en-GB"/>
           </a:p>
@@ -4054,7 +4054,7 @@
         </p:nvSpPr>
         <p:spPr>
           <a:xfrm>
-            <a:off x="3923928" y="3212976"/>
+            <a:off x="3139643" y="3248980"/>
             <a:ext cx="1152128" cy="576064"/>
           </a:xfrm>
           <a:prstGeom prst="rect">
@@ -4142,7 +4142,7 @@
         </p:nvSpPr>
         <p:spPr>
           <a:xfrm>
-            <a:off x="2211343" y="3140968"/>
+            <a:off x="1748386" y="3121147"/>
             <a:ext cx="1224136" cy="720080"/>
           </a:xfrm>
           <a:prstGeom prst="ellipse">
@@ -4172,7 +4172,19 @@
             <a:pPr algn="ctr"/>
             <a:r>
               <a:rPr lang="da-DK" sz="1000" dirty="0" err="1" smtClean="0"/>
-              <a:t>Lst.avai</a:t>
+              <a:t>l</a:t>
+            </a:r>
+            <a:r>
+              <a:rPr lang="da-DK" sz="1000" dirty="0" err="1" smtClean="0"/>
+              <a:t>st.avai</a:t>
+            </a:r>
+            <a:r>
+              <a:rPr lang="da-DK" sz="1000" dirty="0" smtClean="0"/>
+              <a:t> R </a:t>
+            </a:r>
+            <a:r>
+              <a:rPr lang="da-DK" sz="1000" dirty="0" err="1" smtClean="0"/>
+              <a:t>object</a:t>
             </a:r>
             <a:endParaRPr lang="en-GB" sz="1000" dirty="0"/>
           </a:p>
@@ -4242,7 +4254,7 @@
         </p:nvSpPr>
         <p:spPr>
           <a:xfrm>
-            <a:off x="5724128" y="6339273"/>
+            <a:off x="4756281" y="5661248"/>
             <a:ext cx="1224136" cy="720080"/>
           </a:xfrm>
           <a:prstGeom prst="ellipse">
@@ -4344,7 +4356,7 @@
         </p:nvSpPr>
         <p:spPr>
           <a:xfrm>
-            <a:off x="5724128" y="5453608"/>
+            <a:off x="4756281" y="4941168"/>
             <a:ext cx="1224136" cy="720080"/>
           </a:xfrm>
           <a:prstGeom prst="ellipse">
@@ -4400,9 +4412,9 @@
           <p:nvPr/>
         </p:nvCxnSpPr>
         <p:spPr>
-          <a:xfrm>
-            <a:off x="1409237" y="3501008"/>
-            <a:ext cx="802106" cy="0"/>
+          <a:xfrm flipV="1">
+            <a:off x="1409237" y="3481187"/>
+            <a:ext cx="339149" cy="19821"/>
           </a:xfrm>
           <a:prstGeom prst="straightConnector1">
             <a:avLst/>
@@ -4436,7 +4448,7 @@
         </p:nvCxnSpPr>
         <p:spPr>
           <a:xfrm>
-            <a:off x="3435479" y="3501008"/>
+            <a:off x="2972522" y="3481187"/>
             <a:ext cx="632465" cy="0"/>
           </a:xfrm>
           <a:prstGeom prst="straightConnector1">
@@ -4471,9 +4483,9 @@
           <p:nvPr/>
         </p:nvCxnSpPr>
         <p:spPr>
-          <a:xfrm>
-            <a:off x="5076056" y="3501008"/>
-            <a:ext cx="642846" cy="0"/>
+          <a:xfrm flipV="1">
+            <a:off x="4291771" y="3501008"/>
+            <a:ext cx="1427131" cy="36004"/>
           </a:xfrm>
           <a:prstGeom prst="straightConnector1">
             <a:avLst/>
@@ -4688,8 +4700,8 @@
         </p:nvCxnSpPr>
         <p:spPr>
           <a:xfrm flipV="1">
-            <a:off x="6948264" y="5157192"/>
-            <a:ext cx="297120" cy="656456"/>
+            <a:off x="5980417" y="5157192"/>
+            <a:ext cx="1264967" cy="144016"/>
           </a:xfrm>
           <a:prstGeom prst="straightConnector1">
             <a:avLst/>
@@ -4724,8 +4736,8 @@
         </p:nvCxnSpPr>
         <p:spPr>
           <a:xfrm flipV="1">
-            <a:off x="6948264" y="5157192"/>
-            <a:ext cx="297120" cy="1542121"/>
+            <a:off x="5980417" y="5157192"/>
+            <a:ext cx="1264967" cy="864096"/>
           </a:xfrm>
           <a:prstGeom prst="straightConnector1">
             <a:avLst/>
@@ -5196,12 +5208,20 @@
           <a:p>
             <a:pPr algn="ctr"/>
             <a:r>
+              <a:rPr lang="da-DK" sz="1000" dirty="0" err="1"/>
+              <a:t>p</a:t>
+            </a:r>
+            <a:r>
               <a:rPr lang="da-DK" sz="1000" dirty="0" err="1" smtClean="0"/>
-              <a:t>Popsspe</a:t>
+              <a:t>opsspe</a:t>
             </a:r>
             <a:r>
               <a:rPr lang="da-DK" sz="1000" dirty="0" smtClean="0"/>
-              <a:t> files</a:t>
+              <a:t> </a:t>
+            </a:r>
+            <a:r>
+              <a:rPr lang="da-DK" sz="1000" dirty="0" smtClean="0"/>
+              <a:t>files</a:t>
             </a:r>
             <a:endParaRPr lang="en-GB" sz="1000" dirty="0"/>
           </a:p>
@@ -5435,15 +5455,15 @@
         <p:nvCxnSpPr>
           <p:cNvPr id="103" name="Straight Arrow Connector 102"/>
           <p:cNvCxnSpPr>
-            <a:stCxn id="8" idx="2"/>
-            <a:endCxn id="104" idx="1"/>
+            <a:stCxn id="50" idx="2"/>
+            <a:endCxn id="104" idx="2"/>
           </p:cNvCxnSpPr>
           <p:nvPr/>
         </p:nvCxnSpPr>
         <p:spPr>
           <a:xfrm>
-            <a:off x="4427984" y="1268760"/>
-            <a:ext cx="558234" cy="131091"/>
+            <a:off x="3715707" y="3825044"/>
+            <a:ext cx="930250" cy="57447"/>
           </a:xfrm>
           <a:prstGeom prst="straightConnector1">
             <a:avLst/>
@@ -5475,7 +5495,7 @@
         </p:nvSpPr>
         <p:spPr>
           <a:xfrm>
-            <a:off x="4860509" y="1321769"/>
+            <a:off x="4645957" y="3615901"/>
             <a:ext cx="858393" cy="533179"/>
           </a:xfrm>
           <a:prstGeom prst="ellipse">
@@ -5532,15 +5552,15 @@
         <p:nvCxnSpPr>
           <p:cNvPr id="111" name="Elbow Connector 110"/>
           <p:cNvCxnSpPr>
-            <a:stCxn id="104" idx="4"/>
+            <a:stCxn id="104" idx="7"/>
             <a:endCxn id="99" idx="1"/>
           </p:cNvCxnSpPr>
           <p:nvPr/>
         </p:nvCxnSpPr>
         <p:spPr>
-          <a:xfrm rot="16200000" flipH="1">
-            <a:off x="5768043" y="1376611"/>
-            <a:ext cx="999004" cy="1955678"/>
+          <a:xfrm rot="5400000" flipH="1" flipV="1">
+            <a:off x="5891997" y="2340597"/>
+            <a:ext cx="840031" cy="1866743"/>
           </a:xfrm>
           <a:prstGeom prst="bentConnector2">
             <a:avLst/>
@@ -5734,11 +5754,7 @@
             <a:pPr algn="ctr"/>
             <a:r>
               <a:rPr lang="da-DK" sz="1000" dirty="0" err="1" smtClean="0"/>
-              <a:t>Other</a:t>
-            </a:r>
-            <a:r>
-              <a:rPr lang="da-DK" sz="1000" dirty="0" smtClean="0"/>
-              <a:t>  small scripts</a:t>
+              <a:t>GenerateMetierVariousFiles</a:t>
             </a:r>
             <a:endParaRPr lang="en-GB" sz="1000" dirty="0"/>
           </a:p>
@@ -5787,6 +5803,18 @@
             <a:r>
               <a:rPr lang="da-DK" sz="1000" dirty="0" err="1" smtClean="0"/>
               <a:t>graph</a:t>
+            </a:r>
+            <a:r>
+              <a:rPr lang="da-DK" sz="1000" dirty="0" smtClean="0"/>
+              <a:t> </a:t>
+            </a:r>
+            <a:r>
+              <a:rPr lang="da-DK" sz="1000" dirty="0" err="1" smtClean="0"/>
+              <a:t>built</a:t>
+            </a:r>
+            <a:r>
+              <a:rPr lang="da-DK" sz="1000" dirty="0" smtClean="0"/>
+              <a:t> in the UI</a:t>
             </a:r>
             <a:endParaRPr lang="en-GB" sz="1000" dirty="0"/>
           </a:p>
@@ -5979,7 +6007,7 @@
         </p:nvSpPr>
         <p:spPr>
           <a:xfrm>
-            <a:off x="7047317" y="2018537"/>
+            <a:off x="4112926" y="2643121"/>
             <a:ext cx="774131" cy="489846"/>
           </a:xfrm>
           <a:prstGeom prst="ellipse">
@@ -6032,15 +6060,15 @@
         <p:nvCxnSpPr>
           <p:cNvPr id="128" name="Straight Arrow Connector 127"/>
           <p:cNvCxnSpPr>
-            <a:stCxn id="104" idx="4"/>
-            <a:endCxn id="6" idx="0"/>
+            <a:stCxn id="104" idx="1"/>
+            <a:endCxn id="6" idx="1"/>
           </p:cNvCxnSpPr>
           <p:nvPr/>
         </p:nvCxnSpPr>
         <p:spPr>
-          <a:xfrm flipH="1">
-            <a:off x="4427984" y="1854948"/>
-            <a:ext cx="861722" cy="68135"/>
+          <a:xfrm flipH="1" flipV="1">
+            <a:off x="3851920" y="2211115"/>
+            <a:ext cx="919746" cy="1482868"/>
           </a:xfrm>
           <a:prstGeom prst="straightConnector1">
             <a:avLst/>
@@ -6076,12 +6104,12 @@
         </p:nvCxnSpPr>
         <p:spPr>
           <a:xfrm rot="5400000" flipH="1" flipV="1">
-            <a:off x="6560533" y="-866162"/>
-            <a:ext cx="917105" cy="3458758"/>
+            <a:off x="5306191" y="173628"/>
+            <a:ext cx="3211237" cy="3673310"/>
           </a:xfrm>
           <a:prstGeom prst="bentConnector3">
             <a:avLst>
-              <a:gd name="adj1" fmla="val 124926"/>
+              <a:gd name="adj1" fmla="val 107119"/>
             </a:avLst>
           </a:prstGeom>
           <a:ln>
@@ -6108,15 +6136,923 @@
         <p:nvCxnSpPr>
           <p:cNvPr id="144" name="Straight Arrow Connector 143"/>
           <p:cNvCxnSpPr>
-            <a:stCxn id="30" idx="6"/>
-            <a:endCxn id="126" idx="2"/>
+            <a:stCxn id="6" idx="2"/>
+            <a:endCxn id="126" idx="0"/>
           </p:cNvCxnSpPr>
           <p:nvPr/>
         </p:nvCxnSpPr>
         <p:spPr>
           <a:xfrm>
-            <a:off x="6927366" y="2204864"/>
-            <a:ext cx="119951" cy="58596"/>
+            <a:off x="4427984" y="2499147"/>
+            <a:ext cx="72008" cy="143974"/>
+          </a:xfrm>
+          <a:prstGeom prst="straightConnector1">
+            <a:avLst/>
+          </a:prstGeom>
+          <a:ln>
+            <a:tailEnd type="arrow"/>
+          </a:ln>
+        </p:spPr>
+        <p:style>
+          <a:lnRef idx="1">
+            <a:schemeClr val="accent1"/>
+          </a:lnRef>
+          <a:fillRef idx="0">
+            <a:schemeClr val="accent1"/>
+          </a:fillRef>
+          <a:effectRef idx="0">
+            <a:schemeClr val="accent1"/>
+          </a:effectRef>
+          <a:fontRef idx="minor">
+            <a:schemeClr val="tx1"/>
+          </a:fontRef>
+        </p:style>
+      </p:cxnSp>
+      <p:sp>
+        <p:nvSpPr>
+          <p:cNvPr id="73" name="Oval 72"/>
+          <p:cNvSpPr/>
+          <p:nvPr/>
+        </p:nvSpPr>
+        <p:spPr>
+          <a:xfrm>
+            <a:off x="5472100" y="6309320"/>
+            <a:ext cx="1224136" cy="720080"/>
+          </a:xfrm>
+          <a:prstGeom prst="ellipse">
+            <a:avLst/>
+          </a:prstGeom>
+          <a:solidFill>
+            <a:srgbClr val="92D050"/>
+          </a:solidFill>
+          <a:ln>
+            <a:noFill/>
+          </a:ln>
+        </p:spPr>
+        <p:style>
+          <a:lnRef idx="2">
+            <a:schemeClr val="accent1">
+              <a:shade val="50000"/>
+            </a:schemeClr>
+          </a:lnRef>
+          <a:fillRef idx="1">
+            <a:schemeClr val="accent1"/>
+          </a:fillRef>
+          <a:effectRef idx="0">
+            <a:schemeClr val="accent1"/>
+          </a:effectRef>
+          <a:fontRef idx="minor">
+            <a:schemeClr val="lt1"/>
+          </a:fontRef>
+        </p:style>
+        <p:txBody>
+          <a:bodyPr rtlCol="0" anchor="ctr"/>
+          <a:lstStyle/>
+          <a:p>
+            <a:pPr algn="ctr"/>
+            <a:r>
+              <a:rPr lang="da-DK" sz="1000" dirty="0" smtClean="0"/>
+              <a:t>Price per </a:t>
+            </a:r>
+            <a:r>
+              <a:rPr lang="da-DK" sz="1000" dirty="0" err="1" smtClean="0"/>
+              <a:t>size</a:t>
+            </a:r>
+            <a:r>
+              <a:rPr lang="da-DK" sz="1000" dirty="0" smtClean="0"/>
+              <a:t> </a:t>
+            </a:r>
+            <a:r>
+              <a:rPr lang="da-DK" sz="1000" dirty="0" err="1" smtClean="0"/>
+              <a:t>category</a:t>
+            </a:r>
+            <a:endParaRPr lang="en-GB" sz="1000" dirty="0"/>
+          </a:p>
+        </p:txBody>
+      </p:sp>
+      <p:sp>
+        <p:nvSpPr>
+          <p:cNvPr id="74" name="Rectangle 73"/>
+          <p:cNvSpPr/>
+          <p:nvPr/>
+        </p:nvSpPr>
+        <p:spPr>
+          <a:xfrm>
+            <a:off x="7245384" y="5870306"/>
+            <a:ext cx="1152128" cy="576064"/>
+          </a:xfrm>
+          <a:prstGeom prst="rect">
+            <a:avLst/>
+          </a:prstGeom>
+        </p:spPr>
+        <p:style>
+          <a:lnRef idx="2">
+            <a:schemeClr val="accent1">
+              <a:shade val="50000"/>
+            </a:schemeClr>
+          </a:lnRef>
+          <a:fillRef idx="1">
+            <a:schemeClr val="accent1"/>
+          </a:fillRef>
+          <a:effectRef idx="0">
+            <a:schemeClr val="accent1"/>
+          </a:effectRef>
+          <a:fontRef idx="minor">
+            <a:schemeClr val="lt1"/>
+          </a:fontRef>
+        </p:style>
+        <p:txBody>
+          <a:bodyPr rtlCol="0" anchor="ctr"/>
+          <a:lstStyle/>
+          <a:p>
+            <a:pPr algn="ctr"/>
+            <a:r>
+              <a:rPr lang="da-DK" sz="1000" dirty="0" err="1" smtClean="0"/>
+              <a:t>GeneratePopulationPricesOnHarbours</a:t>
+            </a:r>
+            <a:endParaRPr lang="en-GB" sz="1000" dirty="0"/>
+          </a:p>
+        </p:txBody>
+      </p:sp>
+      <p:cxnSp>
+        <p:nvCxnSpPr>
+          <p:cNvPr id="76" name="Straight Arrow Connector 75"/>
+          <p:cNvCxnSpPr>
+            <a:stCxn id="73" idx="7"/>
+            <a:endCxn id="74" idx="1"/>
+          </p:cNvCxnSpPr>
+          <p:nvPr/>
+        </p:nvCxnSpPr>
+        <p:spPr>
+          <a:xfrm flipV="1">
+            <a:off x="6516965" y="6158338"/>
+            <a:ext cx="728419" cy="256435"/>
+          </a:xfrm>
+          <a:prstGeom prst="straightConnector1">
+            <a:avLst/>
+          </a:prstGeom>
+          <a:ln>
+            <a:tailEnd type="arrow"/>
+          </a:ln>
+        </p:spPr>
+        <p:style>
+          <a:lnRef idx="1">
+            <a:schemeClr val="accent1"/>
+          </a:lnRef>
+          <a:fillRef idx="0">
+            <a:schemeClr val="accent1"/>
+          </a:fillRef>
+          <a:effectRef idx="0">
+            <a:schemeClr val="accent1"/>
+          </a:effectRef>
+          <a:fontRef idx="minor">
+            <a:schemeClr val="tx1"/>
+          </a:fontRef>
+        </p:style>
+      </p:cxnSp>
+      <p:sp>
+        <p:nvSpPr>
+          <p:cNvPr id="80" name="Oval 79"/>
+          <p:cNvSpPr/>
+          <p:nvPr/>
+        </p:nvSpPr>
+        <p:spPr>
+          <a:xfrm>
+            <a:off x="8575475" y="5798298"/>
+            <a:ext cx="1224136" cy="720080"/>
+          </a:xfrm>
+          <a:prstGeom prst="ellipse">
+            <a:avLst/>
+          </a:prstGeom>
+        </p:spPr>
+        <p:style>
+          <a:lnRef idx="2">
+            <a:schemeClr val="accent1">
+              <a:shade val="50000"/>
+            </a:schemeClr>
+          </a:lnRef>
+          <a:fillRef idx="1">
+            <a:schemeClr val="accent1"/>
+          </a:fillRef>
+          <a:effectRef idx="0">
+            <a:schemeClr val="accent1"/>
+          </a:effectRef>
+          <a:fontRef idx="minor">
+            <a:schemeClr val="lt1"/>
+          </a:fontRef>
+        </p:style>
+        <p:txBody>
+          <a:bodyPr rtlCol="0" anchor="ctr"/>
+          <a:lstStyle/>
+          <a:p>
+            <a:pPr algn="ctr"/>
+            <a:r>
+              <a:rPr lang="da-DK" sz="1000" dirty="0" err="1" smtClean="0"/>
+              <a:t>harbours</a:t>
+            </a:r>
+            <a:r>
+              <a:rPr lang="da-DK" sz="1000" dirty="0" err="1" smtClean="0"/>
+              <a:t>spe</a:t>
+            </a:r>
+            <a:r>
+              <a:rPr lang="da-DK" sz="1000" dirty="0" smtClean="0"/>
+              <a:t> </a:t>
+            </a:r>
+            <a:r>
+              <a:rPr lang="da-DK" sz="1000" dirty="0" smtClean="0"/>
+              <a:t>files</a:t>
+            </a:r>
+            <a:endParaRPr lang="en-GB" sz="1000" dirty="0"/>
+          </a:p>
+        </p:txBody>
+      </p:sp>
+      <p:sp>
+        <p:nvSpPr>
+          <p:cNvPr id="88" name="Rectangle 87"/>
+          <p:cNvSpPr/>
+          <p:nvPr/>
+        </p:nvSpPr>
+        <p:spPr>
+          <a:xfrm>
+            <a:off x="7264384" y="6813376"/>
+            <a:ext cx="1152128" cy="576064"/>
+          </a:xfrm>
+          <a:prstGeom prst="rect">
+            <a:avLst/>
+          </a:prstGeom>
+        </p:spPr>
+        <p:style>
+          <a:lnRef idx="2">
+            <a:schemeClr val="accent1">
+              <a:shade val="50000"/>
+            </a:schemeClr>
+          </a:lnRef>
+          <a:fillRef idx="1">
+            <a:schemeClr val="accent1"/>
+          </a:fillRef>
+          <a:effectRef idx="0">
+            <a:schemeClr val="accent1"/>
+          </a:effectRef>
+          <a:fontRef idx="minor">
+            <a:schemeClr val="lt1"/>
+          </a:fontRef>
+        </p:style>
+        <p:txBody>
+          <a:bodyPr rtlCol="0" anchor="ctr"/>
+          <a:lstStyle/>
+          <a:p>
+            <a:pPr algn="ctr"/>
+            <a:r>
+              <a:rPr lang="da-DK" sz="1000" dirty="0" err="1" smtClean="0"/>
+              <a:t>GenerateSimulationConfigFiles</a:t>
+            </a:r>
+            <a:endParaRPr lang="en-GB" sz="1000" dirty="0"/>
+          </a:p>
+        </p:txBody>
+      </p:sp>
+      <p:sp>
+        <p:nvSpPr>
+          <p:cNvPr id="91" name="Oval 90"/>
+          <p:cNvSpPr/>
+          <p:nvPr/>
+        </p:nvSpPr>
+        <p:spPr>
+          <a:xfrm>
+            <a:off x="8586361" y="6741368"/>
+            <a:ext cx="1224136" cy="720080"/>
+          </a:xfrm>
+          <a:prstGeom prst="ellipse">
+            <a:avLst/>
+          </a:prstGeom>
+        </p:spPr>
+        <p:style>
+          <a:lnRef idx="2">
+            <a:schemeClr val="accent1">
+              <a:shade val="50000"/>
+            </a:schemeClr>
+          </a:lnRef>
+          <a:fillRef idx="1">
+            <a:schemeClr val="accent1"/>
+          </a:fillRef>
+          <a:effectRef idx="0">
+            <a:schemeClr val="accent1"/>
+          </a:effectRef>
+          <a:fontRef idx="minor">
+            <a:schemeClr val="lt1"/>
+          </a:fontRef>
+        </p:style>
+        <p:txBody>
+          <a:bodyPr rtlCol="0" anchor="ctr"/>
+          <a:lstStyle/>
+          <a:p>
+            <a:pPr algn="ctr"/>
+            <a:r>
+              <a:rPr lang="da-DK" sz="1000" dirty="0" err="1" smtClean="0"/>
+              <a:t>simus</a:t>
+            </a:r>
+            <a:r>
+              <a:rPr lang="da-DK" sz="1000" dirty="0" err="1" smtClean="0"/>
+              <a:t>spe</a:t>
+            </a:r>
+            <a:r>
+              <a:rPr lang="da-DK" sz="1000" dirty="0" smtClean="0"/>
+              <a:t> </a:t>
+            </a:r>
+            <a:r>
+              <a:rPr lang="da-DK" sz="1000" dirty="0" smtClean="0"/>
+              <a:t>files</a:t>
+            </a:r>
+            <a:endParaRPr lang="en-GB" sz="1000" dirty="0"/>
+          </a:p>
+        </p:txBody>
+      </p:sp>
+      <p:cxnSp>
+        <p:nvCxnSpPr>
+          <p:cNvPr id="23" name="Straight Arrow Connector 22"/>
+          <p:cNvCxnSpPr>
+            <a:stCxn id="74" idx="3"/>
+            <a:endCxn id="80" idx="2"/>
+          </p:cNvCxnSpPr>
+          <p:nvPr/>
+        </p:nvCxnSpPr>
+        <p:spPr>
+          <a:xfrm>
+            <a:off x="8397512" y="6158338"/>
+            <a:ext cx="177963" cy="0"/>
+          </a:xfrm>
+          <a:prstGeom prst="straightConnector1">
+            <a:avLst/>
+          </a:prstGeom>
+          <a:ln>
+            <a:tailEnd type="arrow"/>
+          </a:ln>
+        </p:spPr>
+        <p:style>
+          <a:lnRef idx="1">
+            <a:schemeClr val="accent1"/>
+          </a:lnRef>
+          <a:fillRef idx="0">
+            <a:schemeClr val="accent1"/>
+          </a:fillRef>
+          <a:effectRef idx="0">
+            <a:schemeClr val="accent1"/>
+          </a:effectRef>
+          <a:fontRef idx="minor">
+            <a:schemeClr val="tx1"/>
+          </a:fontRef>
+        </p:style>
+      </p:cxnSp>
+      <p:cxnSp>
+        <p:nvCxnSpPr>
+          <p:cNvPr id="27" name="Straight Arrow Connector 26"/>
+          <p:cNvCxnSpPr>
+            <a:stCxn id="88" idx="3"/>
+            <a:endCxn id="91" idx="2"/>
+          </p:cNvCxnSpPr>
+          <p:nvPr/>
+        </p:nvCxnSpPr>
+        <p:spPr>
+          <a:xfrm>
+            <a:off x="8416512" y="7101408"/>
+            <a:ext cx="169849" cy="0"/>
+          </a:xfrm>
+          <a:prstGeom prst="straightConnector1">
+            <a:avLst/>
+          </a:prstGeom>
+          <a:ln>
+            <a:tailEnd type="arrow"/>
+          </a:ln>
+        </p:spPr>
+        <p:style>
+          <a:lnRef idx="1">
+            <a:schemeClr val="accent1"/>
+          </a:lnRef>
+          <a:fillRef idx="0">
+            <a:schemeClr val="accent1"/>
+          </a:fillRef>
+          <a:effectRef idx="0">
+            <a:schemeClr val="accent1"/>
+          </a:effectRef>
+          <a:fontRef idx="minor">
+            <a:schemeClr val="tx1"/>
+          </a:fontRef>
+        </p:style>
+      </p:cxnSp>
+      <p:sp>
+        <p:nvSpPr>
+          <p:cNvPr id="93" name="Oval 92"/>
+          <p:cNvSpPr/>
+          <p:nvPr/>
+        </p:nvSpPr>
+        <p:spPr>
+          <a:xfrm>
+            <a:off x="8532440" y="7893496"/>
+            <a:ext cx="1224136" cy="720080"/>
+          </a:xfrm>
+          <a:prstGeom prst="ellipse">
+            <a:avLst/>
+          </a:prstGeom>
+        </p:spPr>
+        <p:style>
+          <a:lnRef idx="2">
+            <a:schemeClr val="accent1">
+              <a:shade val="50000"/>
+            </a:schemeClr>
+          </a:lnRef>
+          <a:fillRef idx="1">
+            <a:schemeClr val="accent1"/>
+          </a:fillRef>
+          <a:effectRef idx="0">
+            <a:schemeClr val="accent1"/>
+          </a:effectRef>
+          <a:fontRef idx="minor">
+            <a:schemeClr val="lt1"/>
+          </a:fontRef>
+        </p:style>
+        <p:txBody>
+          <a:bodyPr rtlCol="0" anchor="ctr"/>
+          <a:lstStyle/>
+          <a:p>
+            <a:pPr algn="ctr"/>
+            <a:r>
+              <a:rPr lang="da-DK" sz="1000" dirty="0" err="1" smtClean="0"/>
+              <a:t>ships</a:t>
+            </a:r>
+            <a:r>
+              <a:rPr lang="da-DK" sz="1000" dirty="0" err="1" smtClean="0"/>
+              <a:t>spe</a:t>
+            </a:r>
+            <a:r>
+              <a:rPr lang="da-DK" sz="1000" dirty="0" smtClean="0"/>
+              <a:t> </a:t>
+            </a:r>
+            <a:r>
+              <a:rPr lang="da-DK" sz="1000" dirty="0" smtClean="0"/>
+              <a:t>files</a:t>
+            </a:r>
+            <a:endParaRPr lang="en-GB" sz="1000" dirty="0"/>
+          </a:p>
+        </p:txBody>
+      </p:sp>
+      <p:sp>
+        <p:nvSpPr>
+          <p:cNvPr id="95" name="Oval 94"/>
+          <p:cNvSpPr/>
+          <p:nvPr/>
+        </p:nvSpPr>
+        <p:spPr>
+          <a:xfrm>
+            <a:off x="8532440" y="8757592"/>
+            <a:ext cx="1224136" cy="720080"/>
+          </a:xfrm>
+          <a:prstGeom prst="ellipse">
+            <a:avLst/>
+          </a:prstGeom>
+        </p:spPr>
+        <p:style>
+          <a:lnRef idx="2">
+            <a:schemeClr val="accent1">
+              <a:shade val="50000"/>
+            </a:schemeClr>
+          </a:lnRef>
+          <a:fillRef idx="1">
+            <a:schemeClr val="accent1"/>
+          </a:fillRef>
+          <a:effectRef idx="0">
+            <a:schemeClr val="accent1"/>
+          </a:effectRef>
+          <a:fontRef idx="minor">
+            <a:schemeClr val="lt1"/>
+          </a:fontRef>
+        </p:style>
+        <p:txBody>
+          <a:bodyPr rtlCol="0" anchor="ctr"/>
+          <a:lstStyle/>
+          <a:p>
+            <a:pPr algn="ctr"/>
+            <a:r>
+              <a:rPr lang="da-DK" sz="1000" dirty="0" err="1" smtClean="0"/>
+              <a:t>fishfarms</a:t>
+            </a:r>
+            <a:r>
+              <a:rPr lang="da-DK" sz="1000" dirty="0" err="1" smtClean="0"/>
+              <a:t>spe</a:t>
+            </a:r>
+            <a:r>
+              <a:rPr lang="da-DK" sz="1000" dirty="0" smtClean="0"/>
+              <a:t> </a:t>
+            </a:r>
+            <a:r>
+              <a:rPr lang="da-DK" sz="1000" dirty="0" smtClean="0"/>
+              <a:t>files</a:t>
+            </a:r>
+            <a:endParaRPr lang="en-GB" sz="1000" dirty="0"/>
+          </a:p>
+        </p:txBody>
+      </p:sp>
+      <p:sp>
+        <p:nvSpPr>
+          <p:cNvPr id="97" name="Oval 96"/>
+          <p:cNvSpPr/>
+          <p:nvPr/>
+        </p:nvSpPr>
+        <p:spPr>
+          <a:xfrm>
+            <a:off x="1269983" y="-315416"/>
+            <a:ext cx="1224136" cy="720080"/>
+          </a:xfrm>
+          <a:prstGeom prst="ellipse">
+            <a:avLst/>
+          </a:prstGeom>
+          <a:solidFill>
+            <a:srgbClr val="92D050"/>
+          </a:solidFill>
+          <a:ln>
+            <a:noFill/>
+          </a:ln>
+        </p:spPr>
+        <p:style>
+          <a:lnRef idx="2">
+            <a:schemeClr val="accent1">
+              <a:shade val="50000"/>
+            </a:schemeClr>
+          </a:lnRef>
+          <a:fillRef idx="1">
+            <a:schemeClr val="accent1"/>
+          </a:fillRef>
+          <a:effectRef idx="0">
+            <a:schemeClr val="accent1"/>
+          </a:effectRef>
+          <a:fontRef idx="minor">
+            <a:schemeClr val="lt1"/>
+          </a:fontRef>
+        </p:style>
+        <p:txBody>
+          <a:bodyPr rtlCol="0" anchor="ctr"/>
+          <a:lstStyle/>
+          <a:p>
+            <a:pPr algn="ctr"/>
+            <a:r>
+              <a:rPr lang="da-DK" sz="1000" dirty="0" smtClean="0"/>
+              <a:t>GIS </a:t>
+            </a:r>
+            <a:r>
+              <a:rPr lang="da-DK" sz="1000" dirty="0" err="1" smtClean="0"/>
+              <a:t>layer</a:t>
+            </a:r>
+            <a:r>
+              <a:rPr lang="da-DK" sz="1000" dirty="0" smtClean="0"/>
+              <a:t> for the region</a:t>
+            </a:r>
+            <a:endParaRPr lang="en-GB" sz="1000" dirty="0"/>
+          </a:p>
+        </p:txBody>
+      </p:sp>
+      <p:cxnSp>
+        <p:nvCxnSpPr>
+          <p:cNvPr id="31" name="Straight Arrow Connector 30"/>
+          <p:cNvCxnSpPr>
+            <a:stCxn id="97" idx="6"/>
+            <a:endCxn id="115" idx="1"/>
+          </p:cNvCxnSpPr>
+          <p:nvPr/>
+        </p:nvCxnSpPr>
+        <p:spPr>
+          <a:xfrm>
+            <a:off x="2494119" y="44624"/>
+            <a:ext cx="212727" cy="60829"/>
+          </a:xfrm>
+          <a:prstGeom prst="straightConnector1">
+            <a:avLst/>
+          </a:prstGeom>
+          <a:ln>
+            <a:tailEnd type="arrow"/>
+          </a:ln>
+        </p:spPr>
+        <p:style>
+          <a:lnRef idx="1">
+            <a:schemeClr val="accent1"/>
+          </a:lnRef>
+          <a:fillRef idx="0">
+            <a:schemeClr val="accent1"/>
+          </a:fillRef>
+          <a:effectRef idx="0">
+            <a:schemeClr val="accent1"/>
+          </a:effectRef>
+          <a:fontRef idx="minor">
+            <a:schemeClr val="tx1"/>
+          </a:fontRef>
+        </p:style>
+      </p:cxnSp>
+      <p:sp>
+        <p:nvSpPr>
+          <p:cNvPr id="102" name="Rectangle 101"/>
+          <p:cNvSpPr/>
+          <p:nvPr/>
+        </p:nvSpPr>
+        <p:spPr>
+          <a:xfrm>
+            <a:off x="7245384" y="9621688"/>
+            <a:ext cx="1152128" cy="576064"/>
+          </a:xfrm>
+          <a:prstGeom prst="rect">
+            <a:avLst/>
+          </a:prstGeom>
+        </p:spPr>
+        <p:style>
+          <a:lnRef idx="2">
+            <a:schemeClr val="accent1">
+              <a:shade val="50000"/>
+            </a:schemeClr>
+          </a:lnRef>
+          <a:fillRef idx="1">
+            <a:schemeClr val="accent1"/>
+          </a:fillRef>
+          <a:effectRef idx="0">
+            <a:schemeClr val="accent1"/>
+          </a:effectRef>
+          <a:fontRef idx="minor">
+            <a:schemeClr val="lt1"/>
+          </a:fontRef>
+        </p:style>
+        <p:txBody>
+          <a:bodyPr rtlCol="0" anchor="ctr"/>
+          <a:lstStyle/>
+          <a:p>
+            <a:pPr algn="ctr"/>
+            <a:r>
+              <a:rPr lang="da-DK" sz="1000" dirty="0" err="1"/>
+              <a:t>GenerateBenthosLandscapeOnNodes</a:t>
+            </a:r>
+            <a:endParaRPr lang="en-GB" sz="1000" dirty="0"/>
+          </a:p>
+        </p:txBody>
+      </p:sp>
+      <p:sp>
+        <p:nvSpPr>
+          <p:cNvPr id="105" name="Oval 104"/>
+          <p:cNvSpPr/>
+          <p:nvPr/>
+        </p:nvSpPr>
+        <p:spPr>
+          <a:xfrm>
+            <a:off x="8532440" y="9549680"/>
+            <a:ext cx="1224136" cy="720080"/>
+          </a:xfrm>
+          <a:prstGeom prst="ellipse">
+            <a:avLst/>
+          </a:prstGeom>
+        </p:spPr>
+        <p:style>
+          <a:lnRef idx="2">
+            <a:schemeClr val="accent1">
+              <a:shade val="50000"/>
+            </a:schemeClr>
+          </a:lnRef>
+          <a:fillRef idx="1">
+            <a:schemeClr val="accent1"/>
+          </a:fillRef>
+          <a:effectRef idx="0">
+            <a:schemeClr val="accent1"/>
+          </a:effectRef>
+          <a:fontRef idx="minor">
+            <a:schemeClr val="lt1"/>
+          </a:fontRef>
+        </p:style>
+        <p:txBody>
+          <a:bodyPr rtlCol="0" anchor="ctr"/>
+          <a:lstStyle/>
+          <a:p>
+            <a:pPr algn="ctr"/>
+            <a:r>
+              <a:rPr lang="da-DK" sz="1000" dirty="0" err="1" smtClean="0"/>
+              <a:t>benthoss</a:t>
+            </a:r>
+            <a:r>
+              <a:rPr lang="da-DK" sz="1000" dirty="0" err="1" smtClean="0"/>
+              <a:t>spe</a:t>
+            </a:r>
+            <a:r>
+              <a:rPr lang="da-DK" sz="1000" dirty="0" smtClean="0"/>
+              <a:t> </a:t>
+            </a:r>
+            <a:r>
+              <a:rPr lang="da-DK" sz="1000" dirty="0" smtClean="0"/>
+              <a:t>files</a:t>
+            </a:r>
+            <a:endParaRPr lang="en-GB" sz="1000" dirty="0"/>
+          </a:p>
+        </p:txBody>
+      </p:sp>
+      <p:cxnSp>
+        <p:nvCxnSpPr>
+          <p:cNvPr id="34" name="Straight Arrow Connector 33"/>
+          <p:cNvCxnSpPr>
+            <a:stCxn id="102" idx="3"/>
+            <a:endCxn id="105" idx="2"/>
+          </p:cNvCxnSpPr>
+          <p:nvPr/>
+        </p:nvCxnSpPr>
+        <p:spPr>
+          <a:xfrm>
+            <a:off x="8397512" y="9909720"/>
+            <a:ext cx="134928" cy="0"/>
+          </a:xfrm>
+          <a:prstGeom prst="straightConnector1">
+            <a:avLst/>
+          </a:prstGeom>
+          <a:ln>
+            <a:tailEnd type="arrow"/>
+          </a:ln>
+        </p:spPr>
+        <p:style>
+          <a:lnRef idx="1">
+            <a:schemeClr val="accent1"/>
+          </a:lnRef>
+          <a:fillRef idx="0">
+            <a:schemeClr val="accent1"/>
+          </a:fillRef>
+          <a:effectRef idx="0">
+            <a:schemeClr val="accent1"/>
+          </a:effectRef>
+          <a:fontRef idx="minor">
+            <a:schemeClr val="tx1"/>
+          </a:fontRef>
+        </p:style>
+      </p:cxnSp>
+      <p:sp>
+        <p:nvSpPr>
+          <p:cNvPr id="106" name="Rectangle 105"/>
+          <p:cNvSpPr/>
+          <p:nvPr/>
+        </p:nvSpPr>
+        <p:spPr>
+          <a:xfrm>
+            <a:off x="7245384" y="8854802"/>
+            <a:ext cx="1152128" cy="576064"/>
+          </a:xfrm>
+          <a:prstGeom prst="rect">
+            <a:avLst/>
+          </a:prstGeom>
+        </p:spPr>
+        <p:style>
+          <a:lnRef idx="2">
+            <a:schemeClr val="accent1">
+              <a:shade val="50000"/>
+            </a:schemeClr>
+          </a:lnRef>
+          <a:fillRef idx="1">
+            <a:schemeClr val="accent1"/>
+          </a:fillRef>
+          <a:effectRef idx="0">
+            <a:schemeClr val="accent1"/>
+          </a:effectRef>
+          <a:fontRef idx="minor">
+            <a:schemeClr val="lt1"/>
+          </a:fontRef>
+        </p:style>
+        <p:txBody>
+          <a:bodyPr rtlCol="0" anchor="ctr"/>
+          <a:lstStyle/>
+          <a:p>
+            <a:pPr algn="ctr"/>
+            <a:r>
+              <a:rPr lang="da-DK" sz="1000" dirty="0" err="1" smtClean="0"/>
+              <a:t>GenerateFishfarmsFiles</a:t>
+            </a:r>
+            <a:endParaRPr lang="en-GB" sz="1000" dirty="0"/>
+          </a:p>
+        </p:txBody>
+      </p:sp>
+      <p:sp>
+        <p:nvSpPr>
+          <p:cNvPr id="107" name="Rectangle 106"/>
+          <p:cNvSpPr/>
+          <p:nvPr/>
+        </p:nvSpPr>
+        <p:spPr>
+          <a:xfrm>
+            <a:off x="7245384" y="7965504"/>
+            <a:ext cx="1152128" cy="576064"/>
+          </a:xfrm>
+          <a:prstGeom prst="rect">
+            <a:avLst/>
+          </a:prstGeom>
+        </p:spPr>
+        <p:style>
+          <a:lnRef idx="2">
+            <a:schemeClr val="accent1">
+              <a:shade val="50000"/>
+            </a:schemeClr>
+          </a:lnRef>
+          <a:fillRef idx="1">
+            <a:schemeClr val="accent1"/>
+          </a:fillRef>
+          <a:effectRef idx="0">
+            <a:schemeClr val="accent1"/>
+          </a:effectRef>
+          <a:fontRef idx="minor">
+            <a:schemeClr val="lt1"/>
+          </a:fontRef>
+        </p:style>
+        <p:txBody>
+          <a:bodyPr rtlCol="0" anchor="ctr"/>
+          <a:lstStyle/>
+          <a:p>
+            <a:pPr algn="ctr"/>
+            <a:r>
+              <a:rPr lang="da-DK" sz="1000" dirty="0" err="1" smtClean="0"/>
+              <a:t>GenerateShipsFiles</a:t>
+            </a:r>
+            <a:endParaRPr lang="en-GB" sz="1000" dirty="0"/>
+          </a:p>
+        </p:txBody>
+      </p:sp>
+      <p:cxnSp>
+        <p:nvCxnSpPr>
+          <p:cNvPr id="37" name="Straight Arrow Connector 36"/>
+          <p:cNvCxnSpPr>
+            <a:stCxn id="106" idx="3"/>
+            <a:endCxn id="95" idx="2"/>
+          </p:cNvCxnSpPr>
+          <p:nvPr/>
+        </p:nvCxnSpPr>
+        <p:spPr>
+          <a:xfrm flipV="1">
+            <a:off x="8397512" y="9117632"/>
+            <a:ext cx="134928" cy="25202"/>
+          </a:xfrm>
+          <a:prstGeom prst="straightConnector1">
+            <a:avLst/>
+          </a:prstGeom>
+          <a:ln>
+            <a:tailEnd type="arrow"/>
+          </a:ln>
+        </p:spPr>
+        <p:style>
+          <a:lnRef idx="1">
+            <a:schemeClr val="accent1"/>
+          </a:lnRef>
+          <a:fillRef idx="0">
+            <a:schemeClr val="accent1"/>
+          </a:fillRef>
+          <a:effectRef idx="0">
+            <a:schemeClr val="accent1"/>
+          </a:effectRef>
+          <a:fontRef idx="minor">
+            <a:schemeClr val="tx1"/>
+          </a:fontRef>
+        </p:style>
+      </p:cxnSp>
+      <p:cxnSp>
+        <p:nvCxnSpPr>
+          <p:cNvPr id="39" name="Straight Arrow Connector 38"/>
+          <p:cNvCxnSpPr>
+            <a:stCxn id="107" idx="3"/>
+            <a:endCxn id="93" idx="2"/>
+          </p:cNvCxnSpPr>
+          <p:nvPr/>
+        </p:nvCxnSpPr>
+        <p:spPr>
+          <a:xfrm>
+            <a:off x="8397512" y="8253536"/>
+            <a:ext cx="134928" cy="0"/>
+          </a:xfrm>
+          <a:prstGeom prst="straightConnector1">
+            <a:avLst/>
+          </a:prstGeom>
+          <a:ln>
+            <a:tailEnd type="arrow"/>
+          </a:ln>
+        </p:spPr>
+        <p:style>
+          <a:lnRef idx="1">
+            <a:schemeClr val="accent1"/>
+          </a:lnRef>
+          <a:fillRef idx="0">
+            <a:schemeClr val="accent1"/>
+          </a:fillRef>
+          <a:effectRef idx="0">
+            <a:schemeClr val="accent1"/>
+          </a:effectRef>
+          <a:fontRef idx="minor">
+            <a:schemeClr val="tx1"/>
+          </a:fontRef>
+        </p:style>
+      </p:cxnSp>
+      <p:cxnSp>
+        <p:nvCxnSpPr>
+          <p:cNvPr id="108" name="Straight Arrow Connector 107"/>
+          <p:cNvCxnSpPr>
+            <a:stCxn id="7" idx="3"/>
+            <a:endCxn id="90" idx="1"/>
+          </p:cNvCxnSpPr>
+          <p:nvPr/>
+        </p:nvCxnSpPr>
+        <p:spPr>
+          <a:xfrm>
+            <a:off x="8397512" y="1693575"/>
+            <a:ext cx="331314" cy="3188511"/>
           </a:xfrm>
           <a:prstGeom prst="straightConnector1">
             <a:avLst/>

</xml_diff>

<commit_message>
Fix for the catch equation parameters
</commit_message>
<xml_diff>
--- a/PathsForRoutineInR.pptx
+++ b/PathsForRoutineInR.pptx
@@ -3103,7 +3103,7 @@
         </p:nvSpPr>
         <p:spPr>
           <a:xfrm>
-            <a:off x="596258" y="1916832"/>
+            <a:off x="20194" y="1916832"/>
             <a:ext cx="1152128" cy="576064"/>
           </a:xfrm>
           <a:prstGeom prst="rect">
@@ -3203,7 +3203,7 @@
         </p:nvSpPr>
         <p:spPr>
           <a:xfrm>
-            <a:off x="3851920" y="1923083"/>
+            <a:off x="3275856" y="1923083"/>
             <a:ext cx="1152128" cy="576064"/>
           </a:xfrm>
           <a:prstGeom prst="rect">
@@ -3291,7 +3291,7 @@
         </p:nvSpPr>
         <p:spPr>
           <a:xfrm>
-            <a:off x="3851920" y="692696"/>
+            <a:off x="3275856" y="692696"/>
             <a:ext cx="1152128" cy="576064"/>
           </a:xfrm>
           <a:prstGeom prst="rect">
@@ -3335,7 +3335,7 @@
         </p:nvSpPr>
         <p:spPr>
           <a:xfrm>
-            <a:off x="2211343" y="1844824"/>
+            <a:off x="1635279" y="1844824"/>
             <a:ext cx="1224136" cy="720080"/>
           </a:xfrm>
           <a:prstGeom prst="ellipse">
@@ -3387,7 +3387,7 @@
         </p:nvSpPr>
         <p:spPr>
           <a:xfrm>
-            <a:off x="755576" y="620688"/>
+            <a:off x="179512" y="620688"/>
             <a:ext cx="1224136" cy="720080"/>
           </a:xfrm>
           <a:prstGeom prst="ellipse">
@@ -3443,7 +3443,7 @@
         </p:nvSpPr>
         <p:spPr>
           <a:xfrm>
-            <a:off x="-684584" y="692696"/>
+            <a:off x="-1260648" y="692696"/>
             <a:ext cx="1152128" cy="576064"/>
           </a:xfrm>
           <a:prstGeom prst="rect">
@@ -3490,7 +3490,7 @@
         </p:nvCxnSpPr>
         <p:spPr>
           <a:xfrm flipH="1">
-            <a:off x="1172322" y="1340768"/>
+            <a:off x="596258" y="1340768"/>
             <a:ext cx="195322" cy="576064"/>
           </a:xfrm>
           <a:prstGeom prst="straightConnector1">
@@ -3525,7 +3525,7 @@
         </p:nvCxnSpPr>
         <p:spPr>
           <a:xfrm>
-            <a:off x="1979712" y="980728"/>
+            <a:off x="1403648" y="980728"/>
             <a:ext cx="2088232" cy="0"/>
           </a:xfrm>
           <a:prstGeom prst="straightConnector1">
@@ -3561,7 +3561,7 @@
         </p:nvCxnSpPr>
         <p:spPr>
           <a:xfrm>
-            <a:off x="1748386" y="2204864"/>
+            <a:off x="1172322" y="2204864"/>
             <a:ext cx="462957" cy="0"/>
           </a:xfrm>
           <a:prstGeom prst="straightConnector1">
@@ -3597,7 +3597,7 @@
         </p:nvCxnSpPr>
         <p:spPr>
           <a:xfrm>
-            <a:off x="3435479" y="2204864"/>
+            <a:off x="2859415" y="2204864"/>
             <a:ext cx="416441" cy="6251"/>
           </a:xfrm>
           <a:prstGeom prst="straightConnector1">
@@ -3633,8 +3633,8 @@
         </p:nvCxnSpPr>
         <p:spPr>
           <a:xfrm>
-            <a:off x="5004048" y="980728"/>
-            <a:ext cx="714854" cy="0"/>
+            <a:off x="4427984" y="980728"/>
+            <a:ext cx="1290918" cy="0"/>
           </a:xfrm>
           <a:prstGeom prst="straightConnector1">
             <a:avLst/>
@@ -3669,8 +3669,8 @@
         </p:nvCxnSpPr>
         <p:spPr>
           <a:xfrm flipV="1">
-            <a:off x="5004048" y="2204864"/>
-            <a:ext cx="699182" cy="6251"/>
+            <a:off x="4427984" y="2204864"/>
+            <a:ext cx="1275246" cy="6251"/>
           </a:xfrm>
           <a:prstGeom prst="straightConnector1">
             <a:avLst/>
@@ -3741,7 +3741,7 @@
         </p:nvCxnSpPr>
         <p:spPr>
           <a:xfrm>
-            <a:off x="467544" y="980728"/>
+            <a:off x="-108520" y="980728"/>
             <a:ext cx="288032" cy="0"/>
           </a:xfrm>
           <a:prstGeom prst="straightConnector1">
@@ -3914,7 +3914,7 @@
         </p:nvSpPr>
         <p:spPr>
           <a:xfrm>
-            <a:off x="3860442" y="4221088"/>
+            <a:off x="4141240" y="4231350"/>
             <a:ext cx="1152128" cy="576064"/>
           </a:xfrm>
           <a:prstGeom prst="rect">
@@ -4054,7 +4054,7 @@
         </p:nvSpPr>
         <p:spPr>
           <a:xfrm>
-            <a:off x="3139643" y="3248980"/>
+            <a:off x="2563579" y="3248980"/>
             <a:ext cx="1152128" cy="576064"/>
           </a:xfrm>
           <a:prstGeom prst="rect">
@@ -4098,7 +4098,7 @@
         </p:nvSpPr>
         <p:spPr>
           <a:xfrm>
-            <a:off x="257109" y="3212976"/>
+            <a:off x="-318955" y="3212976"/>
             <a:ext cx="1152128" cy="576064"/>
           </a:xfrm>
           <a:prstGeom prst="rect">
@@ -4142,7 +4142,7 @@
         </p:nvSpPr>
         <p:spPr>
           <a:xfrm>
-            <a:off x="1748386" y="3121147"/>
+            <a:off x="1172322" y="3121147"/>
             <a:ext cx="1224136" cy="720080"/>
           </a:xfrm>
           <a:prstGeom prst="ellipse">
@@ -4172,11 +4172,7 @@
             <a:pPr algn="ctr"/>
             <a:r>
               <a:rPr lang="da-DK" sz="1000" dirty="0" err="1" smtClean="0"/>
-              <a:t>l</a:t>
-            </a:r>
-            <a:r>
-              <a:rPr lang="da-DK" sz="1000" dirty="0" err="1" smtClean="0"/>
-              <a:t>st.avai</a:t>
+              <a:t>lst.avai</a:t>
             </a:r>
             <a:r>
               <a:rPr lang="da-DK" sz="1000" dirty="0" smtClean="0"/>
@@ -4413,7 +4409,7 @@
         </p:nvCxnSpPr>
         <p:spPr>
           <a:xfrm flipV="1">
-            <a:off x="1409237" y="3481187"/>
+            <a:off x="833173" y="3481187"/>
             <a:ext cx="339149" cy="19821"/>
           </a:xfrm>
           <a:prstGeom prst="straightConnector1">
@@ -4448,7 +4444,7 @@
         </p:nvCxnSpPr>
         <p:spPr>
           <a:xfrm>
-            <a:off x="2972522" y="3481187"/>
+            <a:off x="2396458" y="3481187"/>
             <a:ext cx="632465" cy="0"/>
           </a:xfrm>
           <a:prstGeom prst="straightConnector1">
@@ -4484,8 +4480,8 @@
         </p:nvCxnSpPr>
         <p:spPr>
           <a:xfrm flipV="1">
-            <a:off x="4291771" y="3501008"/>
-            <a:ext cx="1427131" cy="36004"/>
+            <a:off x="3715707" y="3501008"/>
+            <a:ext cx="2003195" cy="36004"/>
           </a:xfrm>
           <a:prstGeom prst="straightConnector1">
             <a:avLst/>
@@ -4591,9 +4587,9 @@
           <p:nvPr/>
         </p:nvCxnSpPr>
         <p:spPr>
-          <a:xfrm>
-            <a:off x="5012570" y="4509120"/>
-            <a:ext cx="711558" cy="0"/>
+          <a:xfrm flipV="1">
+            <a:off x="5293368" y="4509120"/>
+            <a:ext cx="430760" cy="10262"/>
           </a:xfrm>
           <a:prstGeom prst="straightConnector1">
             <a:avLst/>
@@ -4819,7 +4815,7 @@
         </p:nvSpPr>
         <p:spPr>
           <a:xfrm>
-            <a:off x="-756592" y="1374778"/>
+            <a:off x="-1332656" y="1374778"/>
             <a:ext cx="1224136" cy="720080"/>
           </a:xfrm>
           <a:prstGeom prst="ellipse">
@@ -4872,7 +4868,7 @@
         </p:nvCxnSpPr>
         <p:spPr>
           <a:xfrm flipV="1">
-            <a:off x="-144524" y="1268760"/>
+            <a:off x="-720588" y="1268760"/>
             <a:ext cx="36004" cy="106018"/>
           </a:xfrm>
           <a:prstGeom prst="straightConnector1">
@@ -4901,14 +4897,13 @@
         <p:nvCxnSpPr>
           <p:cNvPr id="83" name="Straight Arrow Connector 82"/>
           <p:cNvCxnSpPr>
-            <a:stCxn id="78" idx="4"/>
             <a:endCxn id="11" idx="0"/>
           </p:cNvCxnSpPr>
           <p:nvPr/>
         </p:nvCxnSpPr>
         <p:spPr>
           <a:xfrm flipH="1">
-            <a:off x="-108520" y="548680"/>
+            <a:off x="-684584" y="548680"/>
             <a:ext cx="36004" cy="144016"/>
           </a:xfrm>
           <a:prstGeom prst="straightConnector1">
@@ -5081,7 +5076,7 @@
         </p:nvSpPr>
         <p:spPr>
           <a:xfrm>
-            <a:off x="-54824" y="4221088"/>
+            <a:off x="-630888" y="4221088"/>
             <a:ext cx="1224136" cy="720080"/>
           </a:xfrm>
           <a:prstGeom prst="ellipse">
@@ -5146,7 +5141,7 @@
         </p:nvCxnSpPr>
         <p:spPr>
           <a:xfrm flipV="1">
-            <a:off x="557244" y="3789040"/>
+            <a:off x="-18820" y="3789040"/>
             <a:ext cx="275929" cy="432048"/>
           </a:xfrm>
           <a:prstGeom prst="straightConnector1">
@@ -5217,11 +5212,7 @@
             </a:r>
             <a:r>
               <a:rPr lang="da-DK" sz="1000" dirty="0" smtClean="0"/>
-              <a:t> </a:t>
-            </a:r>
-            <a:r>
-              <a:rPr lang="da-DK" sz="1000" dirty="0" smtClean="0"/>
-              <a:t>files</a:t>
+              <a:t> files</a:t>
             </a:r>
             <a:endParaRPr lang="en-GB" sz="1000" dirty="0"/>
           </a:p>
@@ -5462,8 +5453,8 @@
         </p:nvCxnSpPr>
         <p:spPr>
           <a:xfrm>
-            <a:off x="3715707" y="3825044"/>
-            <a:ext cx="930250" cy="57447"/>
+            <a:off x="3139643" y="3825044"/>
+            <a:ext cx="1346989" cy="36004"/>
           </a:xfrm>
           <a:prstGeom prst="straightConnector1">
             <a:avLst/>
@@ -5495,7 +5486,7 @@
         </p:nvSpPr>
         <p:spPr>
           <a:xfrm>
-            <a:off x="4645957" y="3615901"/>
+            <a:off x="4486632" y="3594458"/>
             <a:ext cx="858393" cy="533179"/>
           </a:xfrm>
           <a:prstGeom prst="ellipse">
@@ -5559,8 +5550,8 @@
         </p:nvCxnSpPr>
         <p:spPr>
           <a:xfrm rot="5400000" flipH="1" flipV="1">
-            <a:off x="5891997" y="2340597"/>
-            <a:ext cx="840031" cy="1866743"/>
+            <a:off x="5823056" y="2250212"/>
+            <a:ext cx="818588" cy="2026068"/>
           </a:xfrm>
           <a:prstGeom prst="bentConnector2">
             <a:avLst/>
@@ -5768,7 +5759,7 @@
         </p:nvSpPr>
         <p:spPr>
           <a:xfrm>
-            <a:off x="2527575" y="0"/>
+            <a:off x="1951511" y="0"/>
             <a:ext cx="1224136" cy="720080"/>
           </a:xfrm>
           <a:prstGeom prst="ellipse">
@@ -5830,7 +5821,7 @@
         </p:nvCxnSpPr>
         <p:spPr>
           <a:xfrm>
-            <a:off x="3435479" y="620688"/>
+            <a:off x="2859415" y="620688"/>
             <a:ext cx="416441" cy="360040"/>
           </a:xfrm>
           <a:prstGeom prst="straightConnector1">
@@ -5866,7 +5857,7 @@
         </p:nvCxnSpPr>
         <p:spPr>
           <a:xfrm flipH="1">
-            <a:off x="833173" y="720080"/>
+            <a:off x="257109" y="720080"/>
             <a:ext cx="2306470" cy="2492896"/>
           </a:xfrm>
           <a:prstGeom prst="straightConnector1">
@@ -6007,7 +5998,7 @@
         </p:nvSpPr>
         <p:spPr>
           <a:xfrm>
-            <a:off x="4112926" y="2643121"/>
+            <a:off x="3536862" y="2643121"/>
             <a:ext cx="774131" cy="489846"/>
           </a:xfrm>
           <a:prstGeom prst="ellipse">
@@ -6067,8 +6058,8 @@
         </p:nvCxnSpPr>
         <p:spPr>
           <a:xfrm flipH="1" flipV="1">
-            <a:off x="3851920" y="2211115"/>
-            <a:ext cx="919746" cy="1482868"/>
+            <a:off x="3275856" y="2211115"/>
+            <a:ext cx="1336485" cy="1461425"/>
           </a:xfrm>
           <a:prstGeom prst="straightConnector1">
             <a:avLst/>
@@ -6104,12 +6095,12 @@
         </p:nvCxnSpPr>
         <p:spPr>
           <a:xfrm rot="5400000" flipH="1" flipV="1">
-            <a:off x="5306191" y="173628"/>
-            <a:ext cx="3211237" cy="3673310"/>
+            <a:off x="5237249" y="83244"/>
+            <a:ext cx="3189794" cy="3832635"/>
           </a:xfrm>
           <a:prstGeom prst="bentConnector3">
             <a:avLst>
-              <a:gd name="adj1" fmla="val 107119"/>
+              <a:gd name="adj1" fmla="val 107167"/>
             </a:avLst>
           </a:prstGeom>
           <a:ln>
@@ -6143,7 +6134,7 @@
         </p:nvCxnSpPr>
         <p:spPr>
           <a:xfrm>
-            <a:off x="4427984" y="2499147"/>
+            <a:off x="3851920" y="2499147"/>
             <a:ext cx="72008" cy="143974"/>
           </a:xfrm>
           <a:prstGeom prst="straightConnector1">
@@ -6348,19 +6339,11 @@
             <a:pPr algn="ctr"/>
             <a:r>
               <a:rPr lang="da-DK" sz="1000" dirty="0" err="1" smtClean="0"/>
-              <a:t>harbours</a:t>
-            </a:r>
-            <a:r>
-              <a:rPr lang="da-DK" sz="1000" dirty="0" err="1" smtClean="0"/>
-              <a:t>spe</a:t>
+              <a:t>harboursspe</a:t>
             </a:r>
             <a:r>
               <a:rPr lang="da-DK" sz="1000" dirty="0" smtClean="0"/>
-              <a:t> </a:t>
-            </a:r>
-            <a:r>
-              <a:rPr lang="da-DK" sz="1000" dirty="0" smtClean="0"/>
-              <a:t>files</a:t>
+              <a:t> files</a:t>
             </a:r>
             <a:endParaRPr lang="en-GB" sz="1000" dirty="0"/>
           </a:p>
@@ -6448,19 +6431,11 @@
             <a:pPr algn="ctr"/>
             <a:r>
               <a:rPr lang="da-DK" sz="1000" dirty="0" err="1" smtClean="0"/>
-              <a:t>simus</a:t>
-            </a:r>
-            <a:r>
-              <a:rPr lang="da-DK" sz="1000" dirty="0" err="1" smtClean="0"/>
-              <a:t>spe</a:t>
+              <a:t>simusspe</a:t>
             </a:r>
             <a:r>
               <a:rPr lang="da-DK" sz="1000" dirty="0" smtClean="0"/>
-              <a:t> </a:t>
-            </a:r>
-            <a:r>
-              <a:rPr lang="da-DK" sz="1000" dirty="0" smtClean="0"/>
-              <a:t>files</a:t>
+              <a:t> files</a:t>
             </a:r>
             <a:endParaRPr lang="en-GB" sz="1000" dirty="0"/>
           </a:p>
@@ -6576,19 +6551,11 @@
             <a:pPr algn="ctr"/>
             <a:r>
               <a:rPr lang="da-DK" sz="1000" dirty="0" err="1" smtClean="0"/>
-              <a:t>ships</a:t>
-            </a:r>
-            <a:r>
-              <a:rPr lang="da-DK" sz="1000" dirty="0" err="1" smtClean="0"/>
-              <a:t>spe</a:t>
+              <a:t>shipsspe</a:t>
             </a:r>
             <a:r>
               <a:rPr lang="da-DK" sz="1000" dirty="0" smtClean="0"/>
-              <a:t> </a:t>
-            </a:r>
-            <a:r>
-              <a:rPr lang="da-DK" sz="1000" dirty="0" smtClean="0"/>
-              <a:t>files</a:t>
+              <a:t> files</a:t>
             </a:r>
             <a:endParaRPr lang="en-GB" sz="1000" dirty="0"/>
           </a:p>
@@ -6632,19 +6599,11 @@
             <a:pPr algn="ctr"/>
             <a:r>
               <a:rPr lang="da-DK" sz="1000" dirty="0" err="1" smtClean="0"/>
-              <a:t>fishfarms</a:t>
-            </a:r>
-            <a:r>
-              <a:rPr lang="da-DK" sz="1000" dirty="0" err="1" smtClean="0"/>
-              <a:t>spe</a:t>
+              <a:t>fishfarmsspe</a:t>
             </a:r>
             <a:r>
               <a:rPr lang="da-DK" sz="1000" dirty="0" smtClean="0"/>
-              <a:t> </a:t>
-            </a:r>
-            <a:r>
-              <a:rPr lang="da-DK" sz="1000" dirty="0" smtClean="0"/>
-              <a:t>files</a:t>
+              <a:t> files</a:t>
             </a:r>
             <a:endParaRPr lang="en-GB" sz="1000" dirty="0"/>
           </a:p>
@@ -6712,14 +6671,13 @@
         <p:nvCxnSpPr>
           <p:cNvPr id="31" name="Straight Arrow Connector 30"/>
           <p:cNvCxnSpPr>
-            <a:stCxn id="97" idx="6"/>
             <a:endCxn id="115" idx="1"/>
           </p:cNvCxnSpPr>
           <p:nvPr/>
         </p:nvCxnSpPr>
         <p:spPr>
           <a:xfrm>
-            <a:off x="2494119" y="44624"/>
+            <a:off x="1918055" y="44624"/>
             <a:ext cx="212727" cy="60829"/>
           </a:xfrm>
           <a:prstGeom prst="straightConnector1">
@@ -6826,19 +6784,11 @@
             <a:pPr algn="ctr"/>
             <a:r>
               <a:rPr lang="da-DK" sz="1000" dirty="0" err="1" smtClean="0"/>
-              <a:t>benthoss</a:t>
-            </a:r>
-            <a:r>
-              <a:rPr lang="da-DK" sz="1000" dirty="0" err="1" smtClean="0"/>
-              <a:t>spe</a:t>
+              <a:t>benthossspe</a:t>
             </a:r>
             <a:r>
               <a:rPr lang="da-DK" sz="1000" dirty="0" smtClean="0"/>
-              <a:t> </a:t>
-            </a:r>
-            <a:r>
-              <a:rPr lang="da-DK" sz="1000" dirty="0" smtClean="0"/>
-              <a:t>files</a:t>
+              <a:t> files</a:t>
             </a:r>
             <a:endParaRPr lang="en-GB" sz="1000" dirty="0"/>
           </a:p>

</xml_diff>

<commit_message>
Fix nb metiers in metier betas parameters
</commit_message>
<xml_diff>
--- a/PathsForRoutineInR.pptx
+++ b/PathsForRoutineInR.pptx
@@ -3247,7 +3247,7 @@
         </p:nvSpPr>
         <p:spPr>
           <a:xfrm>
-            <a:off x="7245384" y="1405543"/>
+            <a:off x="7189817" y="1371151"/>
             <a:ext cx="1152128" cy="576064"/>
           </a:xfrm>
           <a:prstGeom prst="rect">
@@ -3706,7 +3706,7 @@
         <p:spPr>
           <a:xfrm>
             <a:off x="6943038" y="980728"/>
-            <a:ext cx="302346" cy="712847"/>
+            <a:ext cx="246779" cy="678455"/>
           </a:xfrm>
           <a:prstGeom prst="straightConnector1">
             <a:avLst/>
@@ -3829,8 +3829,8 @@
         </p:nvCxnSpPr>
         <p:spPr>
           <a:xfrm flipV="1">
-            <a:off x="6927366" y="1693575"/>
-            <a:ext cx="318018" cy="511289"/>
+            <a:off x="6927366" y="1659183"/>
+            <a:ext cx="262451" cy="545681"/>
           </a:xfrm>
           <a:prstGeom prst="straightConnector1">
             <a:avLst/>
@@ -4765,7 +4765,7 @@
         </p:nvSpPr>
         <p:spPr>
           <a:xfrm>
-            <a:off x="-684584" y="-171400"/>
+            <a:off x="-1115189" y="-196516"/>
             <a:ext cx="1224136" cy="720080"/>
           </a:xfrm>
           <a:prstGeom prst="ellipse">
@@ -5265,8 +5265,8 @@
         </p:nvCxnSpPr>
         <p:spPr>
           <a:xfrm flipV="1">
-            <a:off x="8397512" y="1628800"/>
-            <a:ext cx="177963" cy="64775"/>
+            <a:off x="8341945" y="1628800"/>
+            <a:ext cx="233530" cy="30383"/>
           </a:xfrm>
           <a:prstGeom prst="straightConnector1">
             <a:avLst/>
@@ -5301,8 +5301,8 @@
         </p:nvCxnSpPr>
         <p:spPr>
           <a:xfrm>
-            <a:off x="8397512" y="1693575"/>
-            <a:ext cx="177963" cy="856658"/>
+            <a:off x="8341945" y="1659183"/>
+            <a:ext cx="233530" cy="891050"/>
           </a:xfrm>
           <a:prstGeom prst="straightConnector1">
             <a:avLst/>
@@ -5585,7 +5585,7 @@
         <p:spPr>
           <a:xfrm>
             <a:off x="1992086" y="1257535"/>
-            <a:ext cx="7728857" cy="1667409"/>
+            <a:ext cx="7728857" cy="1863612"/>
           </a:xfrm>
           <a:custGeom>
             <a:avLst/>
@@ -6617,7 +6617,7 @@
         </p:nvSpPr>
         <p:spPr>
           <a:xfrm>
-            <a:off x="1269983" y="-315416"/>
+            <a:off x="865923" y="-315416"/>
             <a:ext cx="1224136" cy="720080"/>
           </a:xfrm>
           <a:prstGeom prst="ellipse">
@@ -7001,8 +7001,8 @@
         </p:nvCxnSpPr>
         <p:spPr>
           <a:xfrm>
-            <a:off x="8397512" y="1693575"/>
-            <a:ext cx="331314" cy="3188511"/>
+            <a:off x="8341945" y="1659183"/>
+            <a:ext cx="386881" cy="3222903"/>
           </a:xfrm>
           <a:prstGeom prst="straightConnector1">
             <a:avLst/>
@@ -7036,6 +7036,13 @@
   <p:clrMapOvr>
     <a:masterClrMapping/>
   </p:clrMapOvr>
+  <p:timing>
+    <p:tnLst>
+      <p:par>
+        <p:cTn id="1" dur="indefinite" restart="never" nodeType="tmRoot"/>
+      </p:par>
+    </p:tnLst>
+  </p:timing>
 </p:sld>
 </file>
 

</xml_diff>